<commit_message>
images and ML tech review
</commit_message>
<xml_diff>
--- a/doc/Technology Review Machine Learning.pptx
+++ b/doc/Technology Review Machine Learning.pptx
@@ -15,27 +15,28 @@
     <p:sldId id="260" r:id="rId10"/>
     <p:sldId id="261" r:id="rId11"/>
     <p:sldId id="262" r:id="rId12"/>
+    <p:sldId id="263" r:id="rId13"/>
   </p:sldIdLst>
   <p:sldSz cy="6858000" cx="12192000"/>
   <p:notesSz cx="6858000" cy="9144000"/>
   <p:embeddedFontLst>
     <p:embeddedFont>
       <p:font typeface="Encode Sans Black"/>
-      <p:bold r:id="rId13"/>
+      <p:bold r:id="rId14"/>
     </p:embeddedFont>
     <p:embeddedFont>
       <p:font typeface="Open Sans Light"/>
-      <p:regular r:id="rId14"/>
-      <p:bold r:id="rId15"/>
-      <p:italic r:id="rId16"/>
-      <p:boldItalic r:id="rId17"/>
+      <p:regular r:id="rId15"/>
+      <p:bold r:id="rId16"/>
+      <p:italic r:id="rId17"/>
+      <p:boldItalic r:id="rId18"/>
     </p:embeddedFont>
     <p:embeddedFont>
       <p:font typeface="Open Sans"/>
-      <p:regular r:id="rId18"/>
-      <p:bold r:id="rId19"/>
-      <p:italic r:id="rId20"/>
-      <p:boldItalic r:id="rId21"/>
+      <p:regular r:id="rId19"/>
+      <p:bold r:id="rId20"/>
+      <p:italic r:id="rId21"/>
+      <p:boldItalic r:id="rId22"/>
     </p:embeddedFont>
   </p:embeddedFontLst>
   <p:defaultTextStyle>
@@ -269,7 +270,7 @@
   </p:defaultTextStyle>
   <p:extLst>
     <p:ext uri="http://customooxmlschemas.google.com/">
-      <go:slidesCustomData xmlns:go="http://customooxmlschemas.google.com/" r:id="rId22" roundtripDataSignature="AMtx7mjk7uhUfxkj4wVzmv/TdeG1WRKt0A=="/>
+      <go:slidesCustomData xmlns:go="http://customooxmlschemas.google.com/" r:id="rId23" roundtripDataSignature="AMtx7miaK2IZ5PD4pEu3FIw4Lm5qad0BSQ=="/>
     </p:ext>
   </p:extLst>
 </p:presentation>
@@ -2584,7 +2585,7 @@
   <p:cSld>
     <p:spTree>
       <p:nvGrpSpPr>
-        <p:cNvPr id="91" name="Shape 91"/>
+        <p:cNvPr id="94" name="Shape 94"/>
         <p:cNvGrpSpPr/>
         <p:nvPr/>
       </p:nvGrpSpPr>
@@ -2598,7 +2599,176 @@
       </p:grpSpPr>
       <p:sp>
         <p:nvSpPr>
-          <p:cNvPr id="92" name="Google Shape;92;p4:notes"/>
+          <p:cNvPr id="95" name="Google Shape;95;g11a0670f12a_0_8:notes"/>
+          <p:cNvSpPr/>
+          <p:nvPr>
+            <p:ph idx="2" type="sldImg"/>
+          </p:nvPr>
+        </p:nvSpPr>
+        <p:spPr>
+          <a:xfrm>
+            <a:off x="685800" y="1143000"/>
+            <a:ext cx="5486400" cy="3086100"/>
+          </a:xfrm>
+          <a:custGeom>
+            <a:rect b="b" l="l" r="r" t="t"/>
+            <a:pathLst>
+              <a:path extrusionOk="0" h="120000" w="120000">
+                <a:moveTo>
+                  <a:pt x="0" y="0"/>
+                </a:moveTo>
+                <a:lnTo>
+                  <a:pt x="120000" y="0"/>
+                </a:lnTo>
+                <a:lnTo>
+                  <a:pt x="120000" y="120000"/>
+                </a:lnTo>
+                <a:lnTo>
+                  <a:pt x="0" y="120000"/>
+                </a:lnTo>
+                <a:close/>
+              </a:path>
+            </a:pathLst>
+          </a:custGeom>
+          <a:noFill/>
+          <a:ln cap="flat" cmpd="sng" w="12700">
+            <a:solidFill>
+              <a:srgbClr val="000000"/>
+            </a:solidFill>
+            <a:prstDash val="solid"/>
+            <a:round/>
+            <a:headEnd len="sm" w="sm" type="none"/>
+            <a:tailEnd len="sm" w="sm" type="none"/>
+          </a:ln>
+        </p:spPr>
+      </p:sp>
+      <p:sp>
+        <p:nvSpPr>
+          <p:cNvPr id="96" name="Google Shape;96;g11a0670f12a_0_8:notes"/>
+          <p:cNvSpPr txBox="1"/>
+          <p:nvPr>
+            <p:ph idx="1" type="body"/>
+          </p:nvPr>
+        </p:nvSpPr>
+        <p:spPr>
+          <a:xfrm>
+            <a:off x="685800" y="4400550"/>
+            <a:ext cx="5486400" cy="3600600"/>
+          </a:xfrm>
+          <a:prstGeom prst="rect">
+            <a:avLst/>
+          </a:prstGeom>
+          <a:noFill/>
+          <a:ln>
+            <a:noFill/>
+          </a:ln>
+        </p:spPr>
+        <p:txBody>
+          <a:bodyPr anchorCtr="0" anchor="t" bIns="45700" lIns="91425" spcFirstLastPara="1" rIns="91425" wrap="square" tIns="45700">
+            <a:noAutofit/>
+          </a:bodyPr>
+          <a:lstStyle/>
+          <a:p>
+            <a:pPr indent="0" lvl="0" marL="0" rtl="0" algn="l">
+              <a:lnSpc>
+                <a:spcPct val="100000"/>
+              </a:lnSpc>
+              <a:spcBef>
+                <a:spcPts val="0"/>
+              </a:spcBef>
+              <a:spcAft>
+                <a:spcPts val="0"/>
+              </a:spcAft>
+              <a:buSzPts val="1400"/>
+              <a:buNone/>
+            </a:pPr>
+            <a:r>
+              <a:t/>
+            </a:r>
+            <a:endParaRPr/>
+          </a:p>
+        </p:txBody>
+      </p:sp>
+      <p:sp>
+        <p:nvSpPr>
+          <p:cNvPr id="97" name="Google Shape;97;g11a0670f12a_0_8:notes"/>
+          <p:cNvSpPr txBox="1"/>
+          <p:nvPr>
+            <p:ph idx="12" type="sldNum"/>
+          </p:nvPr>
+        </p:nvSpPr>
+        <p:spPr>
+          <a:xfrm>
+            <a:off x="3884613" y="8685213"/>
+            <a:ext cx="2971800" cy="458700"/>
+          </a:xfrm>
+          <a:prstGeom prst="rect">
+            <a:avLst/>
+          </a:prstGeom>
+          <a:noFill/>
+          <a:ln>
+            <a:noFill/>
+          </a:ln>
+        </p:spPr>
+        <p:txBody>
+          <a:bodyPr anchorCtr="0" anchor="b" bIns="45700" lIns="91425" spcFirstLastPara="1" rIns="91425" wrap="square" tIns="45700">
+            <a:noAutofit/>
+          </a:bodyPr>
+          <a:lstStyle/>
+          <a:p>
+            <a:pPr indent="0" lvl="0" marL="0" rtl="0" algn="r">
+              <a:lnSpc>
+                <a:spcPct val="100000"/>
+              </a:lnSpc>
+              <a:spcBef>
+                <a:spcPts val="0"/>
+              </a:spcBef>
+              <a:spcAft>
+                <a:spcPts val="0"/>
+              </a:spcAft>
+              <a:buClr>
+                <a:srgbClr val="000000"/>
+              </a:buClr>
+              <a:buSzPts val="1400"/>
+              <a:buFont typeface="Arial"/>
+              <a:buNone/>
+            </a:pPr>
+            <a:fld id="{00000000-1234-1234-1234-123412341234}" type="slidenum">
+              <a:rPr lang="en-US"/>
+              <a:t>‹#›</a:t>
+            </a:fld>
+            <a:endParaRPr/>
+          </a:p>
+        </p:txBody>
+      </p:sp>
+    </p:spTree>
+  </p:cSld>
+  <p:clrMapOvr>
+    <a:masterClrMapping/>
+  </p:clrMapOvr>
+</p:notes>
+</file>
+
+<file path=ppt/notesSlides/notesSlide8.xml><?xml version="1.0" encoding="utf-8"?>
+<p:notes xmlns:a="http://schemas.openxmlformats.org/drawingml/2006/main" xmlns:r="http://schemas.openxmlformats.org/officeDocument/2006/relationships" xmlns:mc="http://schemas.openxmlformats.org/markup-compatibility/2006" xmlns:mv="urn:schemas-microsoft-com:mac:vml" xmlns:p="http://schemas.openxmlformats.org/presentationml/2006/main" xmlns:c="http://schemas.openxmlformats.org/drawingml/2006/chart" xmlns:dgm="http://schemas.openxmlformats.org/drawingml/2006/diagram" xmlns:o="urn:schemas-microsoft-com:office:office" xmlns:v="urn:schemas-microsoft-com:vml" xmlns:pvml="urn:schemas-microsoft-com:office:powerpoint" xmlns:com="http://schemas.openxmlformats.org/drawingml/2006/compatibility" xmlns:p14="http://schemas.microsoft.com/office/powerpoint/2010/main" xmlns:p15="http://schemas.microsoft.com/office/powerpoint/2012/main" xmlns:ahyp="http://schemas.microsoft.com/office/drawing/2018/hyperlinkcolor" showMasterPhAnim="0" showMasterSp="0">
+  <p:cSld>
+    <p:spTree>
+      <p:nvGrpSpPr>
+        <p:cNvPr id="102" name="Shape 102"/>
+        <p:cNvGrpSpPr/>
+        <p:nvPr/>
+      </p:nvGrpSpPr>
+      <p:grpSpPr>
+        <a:xfrm>
+          <a:off x="0" y="0"/>
+          <a:ext cx="0" cy="0"/>
+          <a:chOff x="0" y="0"/>
+          <a:chExt cx="0" cy="0"/>
+        </a:xfrm>
+      </p:grpSpPr>
+      <p:sp>
+        <p:nvSpPr>
+          <p:cNvPr id="103" name="Google Shape;103;p4:notes"/>
           <p:cNvSpPr txBox="1"/>
           <p:nvPr>
             <p:ph idx="1" type="body"/>
@@ -2645,7 +2815,7 @@
       </p:sp>
       <p:sp>
         <p:nvSpPr>
-          <p:cNvPr id="93" name="Google Shape;93;p4:notes"/>
+          <p:cNvPr id="104" name="Google Shape;104;p4:notes"/>
           <p:cNvSpPr/>
           <p:nvPr>
             <p:ph idx="2" type="sldImg"/>
@@ -9503,7 +9673,7 @@
             <a:tbl>
               <a:tblPr>
                 <a:noFill/>
-                <a:tableStyleId>{0A62B790-EF8B-427D-BC42-10687A504AE3}</a:tableStyleId>
+                <a:tableStyleId>{25326031-EB42-494C-8DCF-CAA8A3973919}</a:tableStyleId>
               </a:tblPr>
               <a:tblGrid>
                 <a:gridCol w="1012650"/>
@@ -9763,10 +9933,18 @@
                         <a:buNone/>
                       </a:pPr>
                       <a:r>
-                        <a:rPr lang="en-US" sz="1300"/>
+                        <a:rPr lang="en-US" sz="1300">
+                          <a:solidFill>
+                            <a:srgbClr val="FF0000"/>
+                          </a:solidFill>
+                        </a:rPr>
                         <a:t>0.54450</a:t>
                       </a:r>
-                      <a:endParaRPr sz="1300"/>
+                      <a:endParaRPr sz="1300">
+                        <a:solidFill>
+                          <a:srgbClr val="FF0000"/>
+                        </a:solidFill>
+                      </a:endParaRPr>
                     </a:p>
                     <a:p>
                       <a:pPr indent="0" lvl="0" marL="0" rtl="0" algn="l">
@@ -9802,10 +9980,18 @@
                         <a:buNone/>
                       </a:pPr>
                       <a:r>
-                        <a:rPr lang="en-US" sz="1300"/>
+                        <a:rPr lang="en-US" sz="1300">
+                          <a:solidFill>
+                            <a:srgbClr val="FF0000"/>
+                          </a:solidFill>
+                        </a:rPr>
                         <a:t>0.54300</a:t>
                       </a:r>
-                      <a:endParaRPr sz="1300"/>
+                      <a:endParaRPr sz="1300">
+                        <a:solidFill>
+                          <a:srgbClr val="FF0000"/>
+                        </a:solidFill>
+                      </a:endParaRPr>
                     </a:p>
                     <a:p>
                       <a:pPr indent="0" lvl="0" marL="0" rtl="0" algn="l">
@@ -9841,10 +10027,18 @@
                         <a:buNone/>
                       </a:pPr>
                       <a:r>
-                        <a:rPr lang="en-US" sz="1300"/>
+                        <a:rPr lang="en-US" sz="1300">
+                          <a:solidFill>
+                            <a:srgbClr val="FF0000"/>
+                          </a:solidFill>
+                        </a:rPr>
                         <a:t>2.09661</a:t>
                       </a:r>
-                      <a:endParaRPr sz="1300"/>
+                      <a:endParaRPr sz="1300">
+                        <a:solidFill>
+                          <a:srgbClr val="FF0000"/>
+                        </a:solidFill>
+                      </a:endParaRPr>
                     </a:p>
                     <a:p>
                       <a:pPr indent="0" lvl="0" marL="0" rtl="0" algn="l">
@@ -9880,10 +10074,18 @@
                         <a:buNone/>
                       </a:pPr>
                       <a:r>
-                        <a:rPr lang="en-US" sz="1300"/>
+                        <a:rPr lang="en-US" sz="1300">
+                          <a:solidFill>
+                            <a:srgbClr val="FF0000"/>
+                          </a:solidFill>
+                        </a:rPr>
                         <a:t>1.86602</a:t>
                       </a:r>
-                      <a:endParaRPr sz="1300"/>
+                      <a:endParaRPr sz="1300">
+                        <a:solidFill>
+                          <a:srgbClr val="FF0000"/>
+                        </a:solidFill>
+                      </a:endParaRPr>
                     </a:p>
                     <a:p>
                       <a:pPr indent="0" lvl="0" marL="0" rtl="0" algn="l">
@@ -9920,6 +10122,9 @@
                       </a:pPr>
                       <a:r>
                         <a:rPr lang="en-US" sz="1300">
+                          <a:solidFill>
+                            <a:srgbClr val="FF0000"/>
+                          </a:solidFill>
                           <a:highlight>
                             <a:srgbClr val="FFFFFF"/>
                           </a:highlight>
@@ -9927,6 +10132,9 @@
                         <a:t>0.61850</a:t>
                       </a:r>
                       <a:endParaRPr sz="1300">
+                        <a:solidFill>
+                          <a:srgbClr val="FF0000"/>
+                        </a:solidFill>
                         <a:highlight>
                           <a:srgbClr val="FFFFFF"/>
                         </a:highlight>
@@ -9971,6 +10179,9 @@
                       </a:pPr>
                       <a:r>
                         <a:rPr lang="en-US" sz="1300">
+                          <a:solidFill>
+                            <a:srgbClr val="FF0000"/>
+                          </a:solidFill>
                           <a:highlight>
                             <a:srgbClr val="FFFFFF"/>
                           </a:highlight>
@@ -9978,6 +10189,9 @@
                         <a:t>2.25484</a:t>
                       </a:r>
                       <a:endParaRPr sz="1300">
+                        <a:solidFill>
+                          <a:srgbClr val="FF0000"/>
+                        </a:solidFill>
                         <a:highlight>
                           <a:srgbClr val="FFFFFF"/>
                         </a:highlight>
@@ -10070,6 +10284,9 @@
                       </a:pPr>
                       <a:r>
                         <a:rPr lang="en-US" sz="1300">
+                          <a:solidFill>
+                            <a:srgbClr val="FF0000"/>
+                          </a:solidFill>
                           <a:highlight>
                             <a:srgbClr val="FFFFFF"/>
                           </a:highlight>
@@ -10077,6 +10294,9 @@
                         <a:t>0.67986</a:t>
                       </a:r>
                       <a:endParaRPr sz="1300">
+                        <a:solidFill>
+                          <a:srgbClr val="FF0000"/>
+                        </a:solidFill>
                         <a:highlight>
                           <a:srgbClr val="FFFFFF"/>
                         </a:highlight>
@@ -10125,6 +10345,9 @@
                       </a:pPr>
                       <a:r>
                         <a:rPr lang="en-US" sz="1300">
+                          <a:solidFill>
+                            <a:srgbClr val="FF0000"/>
+                          </a:solidFill>
                           <a:highlight>
                             <a:srgbClr val="FFFFFF"/>
                           </a:highlight>
@@ -10132,6 +10355,9 @@
                         <a:t>0.67835</a:t>
                       </a:r>
                       <a:endParaRPr sz="1300">
+                        <a:solidFill>
+                          <a:srgbClr val="FF0000"/>
+                        </a:solidFill>
                         <a:highlight>
                           <a:srgbClr val="FFFFFF"/>
                         </a:highlight>
@@ -10183,6 +10409,9 @@
                       </a:pPr>
                       <a:r>
                         <a:rPr lang="en-US" sz="1300">
+                          <a:solidFill>
+                            <a:srgbClr val="FF0000"/>
+                          </a:solidFill>
                           <a:highlight>
                             <a:srgbClr val="FFFFFF"/>
                           </a:highlight>
@@ -10190,6 +10419,9 @@
                         <a:t>2.60967</a:t>
                       </a:r>
                       <a:endParaRPr sz="1300">
+                        <a:solidFill>
+                          <a:srgbClr val="FF0000"/>
+                        </a:solidFill>
                         <a:highlight>
                           <a:srgbClr val="FFFFFF"/>
                         </a:highlight>
@@ -10241,6 +10473,9 @@
                       </a:pPr>
                       <a:r>
                         <a:rPr lang="en-US" sz="1300">
+                          <a:solidFill>
+                            <a:srgbClr val="FF0000"/>
+                          </a:solidFill>
                           <a:highlight>
                             <a:srgbClr val="FFFFFF"/>
                           </a:highlight>
@@ -10248,6 +10483,9 @@
                         <a:t>2.34078</a:t>
                       </a:r>
                       <a:endParaRPr sz="1300">
+                        <a:solidFill>
+                          <a:srgbClr val="FF0000"/>
+                        </a:solidFill>
                         <a:highlight>
                           <a:srgbClr val="FFFFFF"/>
                         </a:highlight>
@@ -10296,6 +10534,9 @@
                       </a:pPr>
                       <a:r>
                         <a:rPr lang="en-US" sz="1300">
+                          <a:solidFill>
+                            <a:srgbClr val="FF0000"/>
+                          </a:solidFill>
                           <a:highlight>
                             <a:srgbClr val="FFFFFF"/>
                           </a:highlight>
@@ -10303,6 +10544,9 @@
                         <a:t>0.88036</a:t>
                       </a:r>
                       <a:endParaRPr sz="1300">
+                        <a:solidFill>
+                          <a:srgbClr val="FF0000"/>
+                        </a:solidFill>
                         <a:highlight>
                           <a:srgbClr val="FFFFFF"/>
                         </a:highlight>
@@ -10347,6 +10591,9 @@
                       </a:pPr>
                       <a:r>
                         <a:rPr lang="en-US" sz="1300">
+                          <a:solidFill>
+                            <a:srgbClr val="FF0000"/>
+                          </a:solidFill>
                           <a:highlight>
                             <a:srgbClr val="FFFFFF"/>
                           </a:highlight>
@@ -10354,6 +10601,9 @@
                         <a:t>2.00336</a:t>
                       </a:r>
                       <a:endParaRPr sz="1300">
+                        <a:solidFill>
+                          <a:srgbClr val="FF0000"/>
+                        </a:solidFill>
                         <a:highlight>
                           <a:srgbClr val="FFFFFF"/>
                         </a:highlight>
@@ -10446,6 +10696,9 @@
                       </a:pPr>
                       <a:r>
                         <a:rPr lang="en-US" sz="1300">
+                          <a:solidFill>
+                            <a:srgbClr val="FF0000"/>
+                          </a:solidFill>
                           <a:highlight>
                             <a:srgbClr val="FFFFFF"/>
                           </a:highlight>
@@ -10453,6 +10706,9 @@
                         <a:t>0.57817</a:t>
                       </a:r>
                       <a:endParaRPr sz="1300">
+                        <a:solidFill>
+                          <a:srgbClr val="FF0000"/>
+                        </a:solidFill>
                         <a:highlight>
                           <a:srgbClr val="FFFFFF"/>
                         </a:highlight>
@@ -10501,6 +10757,9 @@
                       </a:pPr>
                       <a:r>
                         <a:rPr lang="en-US" sz="1300">
+                          <a:solidFill>
+                            <a:srgbClr val="FF0000"/>
+                          </a:solidFill>
                           <a:highlight>
                             <a:srgbClr val="FFFFFF"/>
                           </a:highlight>
@@ -10508,6 +10767,9 @@
                         <a:t>1.75041</a:t>
                       </a:r>
                       <a:endParaRPr sz="1300">
+                        <a:solidFill>
+                          <a:srgbClr val="FF0000"/>
+                        </a:solidFill>
                         <a:highlight>
                           <a:srgbClr val="FFFFFF"/>
                         </a:highlight>
@@ -10559,6 +10821,9 @@
                       </a:pPr>
                       <a:r>
                         <a:rPr lang="en-US" sz="1300">
+                          <a:solidFill>
+                            <a:srgbClr val="FF0000"/>
+                          </a:solidFill>
                           <a:highlight>
                             <a:srgbClr val="FFFFFF"/>
                           </a:highlight>
@@ -10566,6 +10831,9 @@
                         <a:t>2.21882</a:t>
                       </a:r>
                       <a:endParaRPr sz="1300">
+                        <a:solidFill>
+                          <a:srgbClr val="FF0000"/>
+                        </a:solidFill>
                         <a:highlight>
                           <a:srgbClr val="FFFFFF"/>
                         </a:highlight>
@@ -10617,6 +10885,9 @@
                       </a:pPr>
                       <a:r>
                         <a:rPr lang="en-US" sz="1300">
+                          <a:solidFill>
+                            <a:srgbClr val="FF0000"/>
+                          </a:solidFill>
                           <a:highlight>
                             <a:srgbClr val="FFFFFF"/>
                           </a:highlight>
@@ -10624,6 +10895,9 @@
                         <a:t>1.98312</a:t>
                       </a:r>
                       <a:endParaRPr sz="1300">
+                        <a:solidFill>
+                          <a:srgbClr val="FF0000"/>
+                        </a:solidFill>
                         <a:highlight>
                           <a:srgbClr val="FFFFFF"/>
                         </a:highlight>
@@ -10668,6 +10942,9 @@
                       </a:pPr>
                       <a:r>
                         <a:rPr lang="en-US" sz="1300">
+                          <a:solidFill>
+                            <a:srgbClr val="FF0000"/>
+                          </a:solidFill>
                           <a:highlight>
                             <a:srgbClr val="FFFFFF"/>
                           </a:highlight>
@@ -10675,6 +10952,9 @@
                         <a:t>0.64437</a:t>
                       </a:r>
                       <a:endParaRPr sz="1300">
+                        <a:solidFill>
+                          <a:srgbClr val="FF0000"/>
+                        </a:solidFill>
                         <a:highlight>
                           <a:srgbClr val="FFFFFF"/>
                         </a:highlight>
@@ -10722,6 +11002,9 @@
                       </a:pPr>
                       <a:r>
                         <a:rPr lang="en-US" sz="1300">
+                          <a:solidFill>
+                            <a:srgbClr val="FF0000"/>
+                          </a:solidFill>
                           <a:highlight>
                             <a:srgbClr val="FFFFFF"/>
                           </a:highlight>
@@ -10729,6 +11012,9 @@
                         <a:t>1.75041</a:t>
                       </a:r>
                       <a:endParaRPr sz="1300">
+                        <a:solidFill>
+                          <a:srgbClr val="FF0000"/>
+                        </a:solidFill>
                         <a:highlight>
                           <a:srgbClr val="FFFFFF"/>
                         </a:highlight>
@@ -10828,6 +11114,9 @@
                       </a:pPr>
                       <a:r>
                         <a:rPr lang="en-US" sz="1300">
+                          <a:solidFill>
+                            <a:srgbClr val="FF0000"/>
+                          </a:solidFill>
                           <a:highlight>
                             <a:srgbClr val="FFFFFF"/>
                           </a:highlight>
@@ -10835,6 +11124,9 @@
                         <a:t>0.49200</a:t>
                       </a:r>
                       <a:endParaRPr sz="1300">
+                        <a:solidFill>
+                          <a:srgbClr val="FF0000"/>
+                        </a:solidFill>
                         <a:highlight>
                           <a:srgbClr val="FFFFFF"/>
                         </a:highlight>
@@ -10883,6 +11175,9 @@
                       </a:pPr>
                       <a:r>
                         <a:rPr lang="en-US" sz="1300">
+                          <a:solidFill>
+                            <a:srgbClr val="FF0000"/>
+                          </a:solidFill>
                           <a:highlight>
                             <a:srgbClr val="FFFFFF"/>
                           </a:highlight>
@@ -10890,6 +11185,9 @@
                         <a:t>0.49135</a:t>
                       </a:r>
                       <a:endParaRPr sz="1300">
+                        <a:solidFill>
+                          <a:srgbClr val="FF0000"/>
+                        </a:solidFill>
                         <a:highlight>
                           <a:srgbClr val="FFFFFF"/>
                         </a:highlight>
@@ -10938,6 +11236,9 @@
                       </a:pPr>
                       <a:r>
                         <a:rPr lang="en-US" sz="1300">
+                          <a:solidFill>
+                            <a:srgbClr val="FF0000"/>
+                          </a:solidFill>
                           <a:highlight>
                             <a:srgbClr val="FFFFFF"/>
                           </a:highlight>
@@ -10945,6 +11246,9 @@
                         <a:t>1.85625</a:t>
                       </a:r>
                       <a:endParaRPr sz="1300">
+                        <a:solidFill>
+                          <a:srgbClr val="FF0000"/>
+                        </a:solidFill>
                         <a:highlight>
                           <a:srgbClr val="FFFFFF"/>
                         </a:highlight>
@@ -10989,6 +11293,9 @@
                       </a:pPr>
                       <a:r>
                         <a:rPr lang="en-US" sz="1300">
+                          <a:solidFill>
+                            <a:srgbClr val="FF0000"/>
+                          </a:solidFill>
                           <a:highlight>
                             <a:srgbClr val="FFFFFF"/>
                           </a:highlight>
@@ -10996,6 +11303,9 @@
                         <a:t>1.67725</a:t>
                       </a:r>
                       <a:endParaRPr sz="1300">
+                        <a:solidFill>
+                          <a:srgbClr val="FF0000"/>
+                        </a:solidFill>
                         <a:highlight>
                           <a:srgbClr val="FFFFFF"/>
                         </a:highlight>
@@ -11040,6 +11350,9 @@
                       </a:pPr>
                       <a:r>
                         <a:rPr lang="en-US" sz="1300">
+                          <a:solidFill>
+                            <a:srgbClr val="FF0000"/>
+                          </a:solidFill>
                           <a:highlight>
                             <a:srgbClr val="FFFFFF"/>
                           </a:highlight>
@@ -11047,6 +11360,9 @@
                         <a:t>1.34071</a:t>
                       </a:r>
                       <a:endParaRPr sz="1300">
+                        <a:solidFill>
+                          <a:srgbClr val="FF0000"/>
+                        </a:solidFill>
                         <a:highlight>
                           <a:srgbClr val="FFFFFF"/>
                         </a:highlight>
@@ -11091,13 +11407,30 @@
                       </a:pPr>
                       <a:r>
                         <a:rPr lang="en-US" sz="1300">
+                          <a:solidFill>
+                            <a:srgbClr val="FF0000"/>
+                          </a:solidFill>
                           <a:highlight>
                             <a:srgbClr val="FFFFFF"/>
                           </a:highlight>
                         </a:rPr>
-                        <a:t>1.56434</a:t>
+                        <a:t>1.56</a:t>
+                      </a:r>
+                      <a:r>
+                        <a:rPr lang="en-US" sz="1300">
+                          <a:solidFill>
+                            <a:srgbClr val="FF0000"/>
+                          </a:solidFill>
+                          <a:highlight>
+                            <a:srgbClr val="FFFFFF"/>
+                          </a:highlight>
+                        </a:rPr>
+                        <a:t>434</a:t>
                       </a:r>
                       <a:endParaRPr sz="1300">
+                        <a:solidFill>
+                          <a:srgbClr val="FF0000"/>
+                        </a:solidFill>
                         <a:highlight>
                           <a:srgbClr val="FFFFFF"/>
                         </a:highlight>
@@ -11119,7 +11452,15 @@
                             <a:srgbClr val="FFFFFF"/>
                           </a:highlight>
                         </a:rPr>
-                        <a:t>2.63053</a:t>
+                        <a:t>2.63</a:t>
+                      </a:r>
+                      <a:r>
+                        <a:rPr lang="en-US" sz="1300">
+                          <a:highlight>
+                            <a:srgbClr val="FFFFFF"/>
+                          </a:highlight>
+                        </a:rPr>
+                        <a:t>053</a:t>
                       </a:r>
                       <a:endParaRPr sz="1300"/>
                     </a:p>
@@ -11206,6 +11547,9 @@
                       </a:pPr>
                       <a:r>
                         <a:rPr lang="en-US" sz="1300">
+                          <a:solidFill>
+                            <a:srgbClr val="FF0000"/>
+                          </a:solidFill>
                           <a:highlight>
                             <a:srgbClr val="FFFFFF"/>
                           </a:highlight>
@@ -11213,6 +11557,9 @@
                         <a:t>0.57402</a:t>
                       </a:r>
                       <a:endParaRPr sz="1300">
+                        <a:solidFill>
+                          <a:srgbClr val="FF0000"/>
+                        </a:solidFill>
                         <a:highlight>
                           <a:srgbClr val="FFFFFF"/>
                         </a:highlight>
@@ -11273,6 +11620,9 @@
                       </a:pPr>
                       <a:r>
                         <a:rPr lang="en-US" sz="1300">
+                          <a:solidFill>
+                            <a:srgbClr val="FF0000"/>
+                          </a:solidFill>
                           <a:highlight>
                             <a:srgbClr val="FFFFFF"/>
                           </a:highlight>
@@ -11280,6 +11630,9 @@
                         <a:t>0.57266</a:t>
                       </a:r>
                       <a:endParaRPr sz="1300">
+                        <a:solidFill>
+                          <a:srgbClr val="FF0000"/>
+                        </a:solidFill>
                         <a:highlight>
                           <a:srgbClr val="FFFFFF"/>
                         </a:highlight>
@@ -11324,6 +11677,9 @@
                       </a:pPr>
                       <a:r>
                         <a:rPr lang="en-US" sz="1300">
+                          <a:solidFill>
+                            <a:srgbClr val="FF0000"/>
+                          </a:solidFill>
                           <a:highlight>
                             <a:srgbClr val="FFFFFF"/>
                           </a:highlight>
@@ -11331,6 +11687,9 @@
                         <a:t>2.22092</a:t>
                       </a:r>
                       <a:endParaRPr sz="1300">
+                        <a:solidFill>
+                          <a:srgbClr val="FF0000"/>
+                        </a:solidFill>
                         <a:highlight>
                           <a:srgbClr val="FFFFFF"/>
                         </a:highlight>
@@ -11378,6 +11737,9 @@
                       </a:pPr>
                       <a:r>
                         <a:rPr lang="en-US" sz="1300">
+                          <a:solidFill>
+                            <a:srgbClr val="FF0000"/>
+                          </a:solidFill>
                           <a:highlight>
                             <a:srgbClr val="FFFFFF"/>
                           </a:highlight>
@@ -11385,6 +11747,9 @@
                         <a:t>1.91589</a:t>
                       </a:r>
                       <a:endParaRPr sz="1300">
+                        <a:solidFill>
+                          <a:srgbClr val="FF0000"/>
+                        </a:solidFill>
                         <a:highlight>
                           <a:srgbClr val="FFFFFF"/>
                         </a:highlight>
@@ -11432,6 +11797,9 @@
                       </a:pPr>
                       <a:r>
                         <a:rPr lang="en-US" sz="1300">
+                          <a:solidFill>
+                            <a:srgbClr val="FF0000"/>
+                          </a:solidFill>
                           <a:highlight>
                             <a:srgbClr val="FFFFFF"/>
                           </a:highlight>
@@ -11439,6 +11807,9 @@
                         <a:t>0.56007</a:t>
                       </a:r>
                       <a:endParaRPr sz="1300">
+                        <a:solidFill>
+                          <a:srgbClr val="FF0000"/>
+                        </a:solidFill>
                         <a:highlight>
                           <a:srgbClr val="FFFFFF"/>
                         </a:highlight>
@@ -11483,6 +11854,9 @@
                       </a:pPr>
                       <a:r>
                         <a:rPr lang="en-US" sz="1300">
+                          <a:solidFill>
+                            <a:srgbClr val="FF0000"/>
+                          </a:solidFill>
                           <a:highlight>
                             <a:srgbClr val="FFFFFF"/>
                           </a:highlight>
@@ -11490,6 +11864,9 @@
                         <a:t>3.39670</a:t>
                       </a:r>
                       <a:endParaRPr sz="1300">
+                        <a:solidFill>
+                          <a:srgbClr val="FF0000"/>
+                        </a:solidFill>
                         <a:highlight>
                           <a:srgbClr val="FFFFFF"/>
                         </a:highlight>
@@ -11531,8 +11908,8 @@
         </p:nvSpPr>
         <p:spPr>
           <a:xfrm>
-            <a:off x="6164700" y="809150"/>
-            <a:ext cx="5683800" cy="615600"/>
+            <a:off x="5958200" y="696450"/>
+            <a:ext cx="6388800" cy="615600"/>
           </a:xfrm>
           <a:prstGeom prst="rect">
             <a:avLst/>
@@ -11548,44 +11925,54 @@
           </a:bodyPr>
           <a:lstStyle/>
           <a:p>
-            <a:pPr indent="0" lvl="0" marL="0" rtl="0" algn="l">
-              <a:spcBef>
-                <a:spcPts val="0"/>
-              </a:spcBef>
-              <a:spcAft>
-                <a:spcPts val="0"/>
-              </a:spcAft>
-              <a:buNone/>
+            <a:pPr indent="-317500" lvl="0" marL="457200" rtl="0" algn="l">
+              <a:spcBef>
+                <a:spcPts val="0"/>
+              </a:spcBef>
+              <a:spcAft>
+                <a:spcPts val="0"/>
+              </a:spcAft>
+              <a:buSzPts val="1400"/>
+              <a:buChar char="●"/>
             </a:pPr>
             <a:r>
-              <a:rPr lang="en-US"/>
-              <a:t>Top </a:t>
+              <a:rPr b="1" lang="en-US">
+                <a:solidFill>
+                  <a:srgbClr val="FF0000"/>
+                </a:solidFill>
+              </a:rPr>
+              <a:t>Red</a:t>
             </a:r>
             <a:r>
-              <a:rPr lang="en-US"/>
+              <a:rPr b="1" lang="en-US"/>
+              <a:t> </a:t>
+            </a:r>
+            <a:r>
+              <a:rPr b="1" lang="en-US"/>
               <a:t>number</a:t>
             </a:r>
             <a:r>
-              <a:rPr lang="en-US"/>
+              <a:rPr b="1" lang="en-US"/>
               <a:t> is the average MSE of y_training to y_validation</a:t>
             </a:r>
-            <a:endParaRPr/>
+            <a:endParaRPr b="1"/>
           </a:p>
           <a:p>
-            <a:pPr indent="0" lvl="0" marL="0" rtl="0" algn="l">
-              <a:spcBef>
-                <a:spcPts val="0"/>
-              </a:spcBef>
-              <a:spcAft>
-                <a:spcPts val="0"/>
-              </a:spcAft>
-              <a:buNone/>
+            <a:pPr indent="-317500" lvl="0" marL="457200" rtl="0" algn="l">
+              <a:spcBef>
+                <a:spcPts val="0"/>
+              </a:spcBef>
+              <a:spcAft>
+                <a:spcPts val="0"/>
+              </a:spcAft>
+              <a:buSzPts val="1400"/>
+              <a:buChar char="●"/>
             </a:pPr>
             <a:r>
-              <a:rPr lang="en-US"/>
-              <a:t>Bottom number is MSE of y_predicted to y_test</a:t>
+              <a:rPr b="1" lang="en-US"/>
+              <a:t>Black number is MSE of y_predicted to y_test</a:t>
             </a:r>
-            <a:endParaRPr/>
+            <a:endParaRPr b="1"/>
           </a:p>
         </p:txBody>
       </p:sp>
@@ -11666,6 +12053,90 @@
           </a:p>
         </p:txBody>
       </p:sp>
+      <p:pic>
+        <p:nvPicPr>
+          <p:cNvPr id="91" name="Google Shape;91;g117022c8735_0_0"/>
+          <p:cNvPicPr preferRelativeResize="0"/>
+          <p:nvPr/>
+        </p:nvPicPr>
+        <p:blipFill>
+          <a:blip r:embed="rId3">
+            <a:alphaModFix/>
+          </a:blip>
+          <a:stretch>
+            <a:fillRect/>
+          </a:stretch>
+        </p:blipFill>
+        <p:spPr>
+          <a:xfrm>
+            <a:off x="0" y="1430578"/>
+            <a:ext cx="4286131" cy="4403226"/>
+          </a:xfrm>
+          <a:prstGeom prst="rect">
+            <a:avLst/>
+          </a:prstGeom>
+          <a:noFill/>
+          <a:ln>
+            <a:noFill/>
+          </a:ln>
+        </p:spPr>
+      </p:pic>
+      <p:pic>
+        <p:nvPicPr>
+          <p:cNvPr id="92" name="Google Shape;92;g117022c8735_0_0"/>
+          <p:cNvPicPr preferRelativeResize="0"/>
+          <p:nvPr/>
+        </p:nvPicPr>
+        <p:blipFill>
+          <a:blip r:embed="rId4">
+            <a:alphaModFix/>
+          </a:blip>
+          <a:stretch>
+            <a:fillRect/>
+          </a:stretch>
+        </p:blipFill>
+        <p:spPr>
+          <a:xfrm>
+            <a:off x="7905872" y="1430583"/>
+            <a:ext cx="4286131" cy="4403226"/>
+          </a:xfrm>
+          <a:prstGeom prst="rect">
+            <a:avLst/>
+          </a:prstGeom>
+          <a:noFill/>
+          <a:ln>
+            <a:noFill/>
+          </a:ln>
+        </p:spPr>
+      </p:pic>
+      <p:pic>
+        <p:nvPicPr>
+          <p:cNvPr id="93" name="Google Shape;93;g117022c8735_0_0"/>
+          <p:cNvPicPr preferRelativeResize="0"/>
+          <p:nvPr/>
+        </p:nvPicPr>
+        <p:blipFill>
+          <a:blip r:embed="rId5">
+            <a:alphaModFix/>
+          </a:blip>
+          <a:stretch>
+            <a:fillRect/>
+          </a:stretch>
+        </p:blipFill>
+        <p:spPr>
+          <a:xfrm>
+            <a:off x="3952927" y="1430565"/>
+            <a:ext cx="4286131" cy="4403226"/>
+          </a:xfrm>
+          <a:prstGeom prst="rect">
+            <a:avLst/>
+          </a:prstGeom>
+          <a:noFill/>
+          <a:ln>
+            <a:noFill/>
+          </a:ln>
+        </p:spPr>
+      </p:pic>
     </p:spTree>
   </p:cSld>
   <p:clrMapOvr>
@@ -11679,7 +12150,7 @@
   <p:cSld>
     <p:spTree>
       <p:nvGrpSpPr>
-        <p:cNvPr id="94" name="Shape 94"/>
+        <p:cNvPr id="98" name="Shape 98"/>
         <p:cNvGrpSpPr/>
         <p:nvPr/>
       </p:nvGrpSpPr>
@@ -11693,7 +12164,140 @@
       </p:grpSpPr>
       <p:sp>
         <p:nvSpPr>
-          <p:cNvPr id="95" name="Google Shape;95;p4"/>
+          <p:cNvPr id="99" name="Google Shape;99;g11a0670f12a_0_8"/>
+          <p:cNvSpPr txBox="1"/>
+          <p:nvPr>
+            <p:ph type="title"/>
+          </p:nvPr>
+        </p:nvSpPr>
+        <p:spPr>
+          <a:xfrm>
+            <a:off x="613833" y="492978"/>
+            <a:ext cx="10896300" cy="678900"/>
+          </a:xfrm>
+          <a:prstGeom prst="rect">
+            <a:avLst/>
+          </a:prstGeom>
+          <a:noFill/>
+          <a:ln>
+            <a:noFill/>
+          </a:ln>
+        </p:spPr>
+        <p:txBody>
+          <a:bodyPr anchorCtr="0" anchor="b" bIns="45700" lIns="91425" spcFirstLastPara="1" rIns="91425" wrap="square" tIns="45700">
+            <a:noAutofit/>
+          </a:bodyPr>
+          <a:lstStyle/>
+          <a:p>
+            <a:pPr indent="0" lvl="0" marL="0" rtl="0" algn="l">
+              <a:lnSpc>
+                <a:spcPct val="100000"/>
+              </a:lnSpc>
+              <a:spcBef>
+                <a:spcPts val="0"/>
+              </a:spcBef>
+              <a:spcAft>
+                <a:spcPts val="0"/>
+              </a:spcAft>
+              <a:buClr>
+                <a:schemeClr val="dk1"/>
+              </a:buClr>
+              <a:buSzPts val="4000"/>
+              <a:buFont typeface="Encode Sans Black"/>
+              <a:buNone/>
+            </a:pPr>
+            <a:r>
+              <a:rPr lang="en-US"/>
+              <a:t>Comparison </a:t>
+            </a:r>
+            <a:endParaRPr/>
+          </a:p>
+        </p:txBody>
+      </p:sp>
+      <p:pic>
+        <p:nvPicPr>
+          <p:cNvPr id="100" name="Google Shape;100;g11a0670f12a_0_8"/>
+          <p:cNvPicPr preferRelativeResize="0"/>
+          <p:nvPr/>
+        </p:nvPicPr>
+        <p:blipFill>
+          <a:blip r:embed="rId3">
+            <a:alphaModFix/>
+          </a:blip>
+          <a:stretch>
+            <a:fillRect/>
+          </a:stretch>
+        </p:blipFill>
+        <p:spPr>
+          <a:xfrm>
+            <a:off x="6061972" y="1441322"/>
+            <a:ext cx="4286131" cy="4403226"/>
+          </a:xfrm>
+          <a:prstGeom prst="rect">
+            <a:avLst/>
+          </a:prstGeom>
+          <a:noFill/>
+          <a:ln>
+            <a:noFill/>
+          </a:ln>
+        </p:spPr>
+      </p:pic>
+      <p:pic>
+        <p:nvPicPr>
+          <p:cNvPr id="101" name="Google Shape;101;g11a0670f12a_0_8"/>
+          <p:cNvPicPr preferRelativeResize="0"/>
+          <p:nvPr/>
+        </p:nvPicPr>
+        <p:blipFill>
+          <a:blip r:embed="rId4">
+            <a:alphaModFix/>
+          </a:blip>
+          <a:stretch>
+            <a:fillRect/>
+          </a:stretch>
+        </p:blipFill>
+        <p:spPr>
+          <a:xfrm>
+            <a:off x="1775838" y="1441331"/>
+            <a:ext cx="4286131" cy="4403226"/>
+          </a:xfrm>
+          <a:prstGeom prst="rect">
+            <a:avLst/>
+          </a:prstGeom>
+          <a:noFill/>
+          <a:ln>
+            <a:noFill/>
+          </a:ln>
+        </p:spPr>
+      </p:pic>
+    </p:spTree>
+  </p:cSld>
+  <p:clrMapOvr>
+    <a:masterClrMapping/>
+  </p:clrMapOvr>
+</p:sld>
+</file>
+
+<file path=ppt/slides/slide8.xml><?xml version="1.0" encoding="utf-8"?>
+<p:sld xmlns:a="http://schemas.openxmlformats.org/drawingml/2006/main" xmlns:r="http://schemas.openxmlformats.org/officeDocument/2006/relationships" xmlns:mc="http://schemas.openxmlformats.org/markup-compatibility/2006" xmlns:mv="urn:schemas-microsoft-com:mac:vml" xmlns:p="http://schemas.openxmlformats.org/presentationml/2006/main" xmlns:c="http://schemas.openxmlformats.org/drawingml/2006/chart" xmlns:dgm="http://schemas.openxmlformats.org/drawingml/2006/diagram" xmlns:o="urn:schemas-microsoft-com:office:office" xmlns:v="urn:schemas-microsoft-com:vml" xmlns:pvml="urn:schemas-microsoft-com:office:powerpoint" xmlns:com="http://schemas.openxmlformats.org/drawingml/2006/compatibility" xmlns:p14="http://schemas.microsoft.com/office/powerpoint/2010/main" xmlns:p15="http://schemas.microsoft.com/office/powerpoint/2012/main" xmlns:ahyp="http://schemas.microsoft.com/office/drawing/2018/hyperlinkcolor">
+  <p:cSld>
+    <p:spTree>
+      <p:nvGrpSpPr>
+        <p:cNvPr id="105" name="Shape 105"/>
+        <p:cNvGrpSpPr/>
+        <p:nvPr/>
+      </p:nvGrpSpPr>
+      <p:grpSpPr>
+        <a:xfrm>
+          <a:off x="0" y="0"/>
+          <a:ext cx="0" cy="0"/>
+          <a:chOff x="0" y="0"/>
+          <a:chExt cx="0" cy="0"/>
+        </a:xfrm>
+      </p:grpSpPr>
+      <p:sp>
+        <p:nvSpPr>
+          <p:cNvPr id="106" name="Google Shape;106;p4"/>
           <p:cNvSpPr txBox="1"/>
           <p:nvPr>
             <p:ph type="title"/>
@@ -11745,7 +12349,7 @@
       </p:sp>
       <p:graphicFrame>
         <p:nvGraphicFramePr>
-          <p:cNvPr id="96" name="Google Shape;96;p4"/>
+          <p:cNvPr id="107" name="Google Shape;107;p4"/>
           <p:cNvGraphicFramePr/>
           <p:nvPr/>
         </p:nvGraphicFramePr>
@@ -11758,7 +12362,7 @@
             <a:tbl>
               <a:tblPr>
                 <a:noFill/>
-                <a:tableStyleId>{0A62B790-EF8B-427D-BC42-10687A504AE3}</a:tableStyleId>
+                <a:tableStyleId>{25326031-EB42-494C-8DCF-CAA8A3973919}</a:tableStyleId>
               </a:tblPr>
               <a:tblGrid>
                 <a:gridCol w="1076625"/>
@@ -12285,7 +12889,7 @@
       </p:graphicFrame>
       <p:pic>
         <p:nvPicPr>
-          <p:cNvPr id="97" name="Google Shape;97;p4"/>
+          <p:cNvPr id="108" name="Google Shape;108;p4"/>
           <p:cNvPicPr preferRelativeResize="0"/>
           <p:nvPr/>
         </p:nvPicPr>
@@ -12299,7 +12903,7 @@
         </p:blipFill>
         <p:spPr>
           <a:xfrm>
-            <a:off x="6292725" y="492984"/>
+            <a:off x="6292725" y="626734"/>
             <a:ext cx="5715201" cy="3691065"/>
           </a:xfrm>
           <a:prstGeom prst="rect">
@@ -12313,7 +12917,7 @@
       </p:pic>
       <p:sp>
         <p:nvSpPr>
-          <p:cNvPr id="98" name="Google Shape;98;p4"/>
+          <p:cNvPr id="109" name="Google Shape;109;p4"/>
           <p:cNvSpPr txBox="1"/>
           <p:nvPr/>
         </p:nvSpPr>
@@ -12348,7 +12952,7 @@
             </a:pPr>
             <a:r>
               <a:rPr lang="en-US" sz="1700"/>
-              <a:t>k-NN showed the best result for most performance metric</a:t>
+              <a:t>K-NN showed the best result for most performance metric</a:t>
             </a:r>
             <a:endParaRPr sz="1700"/>
           </a:p>
@@ -12431,6 +13035,285 @@
 </file>
 
 <file path=ppt/theme/theme1.xml><?xml version="1.0" encoding="utf-8"?>
+<a:theme xmlns:a="http://schemas.openxmlformats.org/drawingml/2006/main" xmlns:r="http://schemas.openxmlformats.org/officeDocument/2006/relationships" name="1_Custom Design">
+  <a:themeElements>
+    <a:clrScheme name="Custom 2">
+      <a:dk1>
+        <a:srgbClr val="4B2E83"/>
+      </a:dk1>
+      <a:lt1>
+        <a:srgbClr val="E8D3A2"/>
+      </a:lt1>
+      <a:dk2>
+        <a:srgbClr val="4B2E83"/>
+      </a:dk2>
+      <a:lt2>
+        <a:srgbClr val="FFFFFF"/>
+      </a:lt2>
+      <a:accent1>
+        <a:srgbClr val="4B2E83"/>
+      </a:accent1>
+      <a:accent2>
+        <a:srgbClr val="E8D3A2"/>
+      </a:accent2>
+      <a:accent3>
+        <a:srgbClr val="FFFFFF"/>
+      </a:accent3>
+      <a:accent4>
+        <a:srgbClr val="D8D9DA"/>
+      </a:accent4>
+      <a:accent5>
+        <a:srgbClr val="999999"/>
+      </a:accent5>
+      <a:accent6>
+        <a:srgbClr val="917B4C"/>
+      </a:accent6>
+      <a:hlink>
+        <a:srgbClr val="D8D9DA"/>
+      </a:hlink>
+      <a:folHlink>
+        <a:srgbClr val="999999"/>
+      </a:folHlink>
+    </a:clrScheme>
+    <a:fontScheme name="Office">
+      <a:majorFont>
+        <a:latin typeface="Arial"/>
+        <a:ea typeface=""/>
+        <a:cs typeface=""/>
+        <a:font script="Jpan" typeface="ＭＳ Ｐゴシック"/>
+        <a:font script="Hang" typeface="맑은 고딕"/>
+        <a:font script="Hans" typeface="宋体"/>
+        <a:font script="Hant" typeface="新細明體"/>
+        <a:font script="Arab" typeface="Times New Roman"/>
+        <a:font script="Hebr" typeface="Times New Roman"/>
+        <a:font script="Thai" typeface="Angsana New"/>
+        <a:font script="Ethi" typeface="Nyala"/>
+        <a:font script="Beng" typeface="Vrinda"/>
+        <a:font script="Gujr" typeface="Shruti"/>
+        <a:font script="Khmr" typeface="MoolBoran"/>
+        <a:font script="Knda" typeface="Tunga"/>
+        <a:font script="Guru" typeface="Raavi"/>
+        <a:font script="Cans" typeface="Euphemia"/>
+        <a:font script="Cher" typeface="Plantagenet Cherokee"/>
+        <a:font script="Yiii" typeface="Microsoft Yi Baiti"/>
+        <a:font script="Tibt" typeface="Microsoft Himalaya"/>
+        <a:font script="Thaa" typeface="MV Boli"/>
+        <a:font script="Deva" typeface="Mangal"/>
+        <a:font script="Telu" typeface="Gautami"/>
+        <a:font script="Taml" typeface="Latha"/>
+        <a:font script="Syrc" typeface="Estrangelo Edessa"/>
+        <a:font script="Orya" typeface="Kalinga"/>
+        <a:font script="Mlym" typeface="Kartika"/>
+        <a:font script="Laoo" typeface="DokChampa"/>
+        <a:font script="Sinh" typeface="Iskoola Pota"/>
+        <a:font script="Mong" typeface="Mongolian Baiti"/>
+        <a:font script="Viet" typeface="Times New Roman"/>
+        <a:font script="Uigh" typeface="Microsoft Uighur"/>
+        <a:font script="Geor" typeface="Sylfaen"/>
+      </a:majorFont>
+      <a:minorFont>
+        <a:latin typeface="Arial"/>
+        <a:ea typeface=""/>
+        <a:cs typeface=""/>
+        <a:font script="Jpan" typeface="ＭＳ Ｐゴシック"/>
+        <a:font script="Hang" typeface="맑은 고딕"/>
+        <a:font script="Hans" typeface="宋体"/>
+        <a:font script="Hant" typeface="新細明體"/>
+        <a:font script="Arab" typeface="Arial"/>
+        <a:font script="Hebr" typeface="Arial"/>
+        <a:font script="Thai" typeface="Cordia New"/>
+        <a:font script="Ethi" typeface="Nyala"/>
+        <a:font script="Beng" typeface="Vrinda"/>
+        <a:font script="Gujr" typeface="Shruti"/>
+        <a:font script="Khmr" typeface="DaunPenh"/>
+        <a:font script="Knda" typeface="Tunga"/>
+        <a:font script="Guru" typeface="Raavi"/>
+        <a:font script="Cans" typeface="Euphemia"/>
+        <a:font script="Cher" typeface="Plantagenet Cherokee"/>
+        <a:font script="Yiii" typeface="Microsoft Yi Baiti"/>
+        <a:font script="Tibt" typeface="Microsoft Himalaya"/>
+        <a:font script="Thaa" typeface="MV Boli"/>
+        <a:font script="Deva" typeface="Mangal"/>
+        <a:font script="Telu" typeface="Gautami"/>
+        <a:font script="Taml" typeface="Latha"/>
+        <a:font script="Syrc" typeface="Estrangelo Edessa"/>
+        <a:font script="Orya" typeface="Kalinga"/>
+        <a:font script="Mlym" typeface="Kartika"/>
+        <a:font script="Laoo" typeface="DokChampa"/>
+        <a:font script="Sinh" typeface="Iskoola Pota"/>
+        <a:font script="Mong" typeface="Mongolian Baiti"/>
+        <a:font script="Viet" typeface="Arial"/>
+        <a:font script="Uigh" typeface="Microsoft Uighur"/>
+        <a:font script="Geor" typeface="Sylfaen"/>
+      </a:minorFont>
+    </a:fontScheme>
+    <a:fmtScheme name="Office">
+      <a:fillStyleLst>
+        <a:solidFill>
+          <a:schemeClr val="phClr"/>
+        </a:solidFill>
+        <a:gradFill rotWithShape="1">
+          <a:gsLst>
+            <a:gs pos="0">
+              <a:schemeClr val="phClr">
+                <a:tint val="50000"/>
+                <a:satMod val="300000"/>
+              </a:schemeClr>
+            </a:gs>
+            <a:gs pos="35000">
+              <a:schemeClr val="phClr">
+                <a:tint val="37000"/>
+                <a:satMod val="300000"/>
+              </a:schemeClr>
+            </a:gs>
+            <a:gs pos="100000">
+              <a:schemeClr val="phClr">
+                <a:tint val="15000"/>
+                <a:satMod val="350000"/>
+              </a:schemeClr>
+            </a:gs>
+          </a:gsLst>
+          <a:lin ang="16200000" scaled="1"/>
+        </a:gradFill>
+        <a:gradFill rotWithShape="1">
+          <a:gsLst>
+            <a:gs pos="0">
+              <a:schemeClr val="phClr">
+                <a:tint val="100000"/>
+                <a:shade val="100000"/>
+                <a:satMod val="130000"/>
+              </a:schemeClr>
+            </a:gs>
+            <a:gs pos="100000">
+              <a:schemeClr val="phClr">
+                <a:tint val="50000"/>
+                <a:shade val="100000"/>
+                <a:satMod val="350000"/>
+              </a:schemeClr>
+            </a:gs>
+          </a:gsLst>
+          <a:lin ang="16200000" scaled="0"/>
+        </a:gradFill>
+      </a:fillStyleLst>
+      <a:lnStyleLst>
+        <a:ln w="9525" cap="flat" cmpd="sng" algn="ctr">
+          <a:solidFill>
+            <a:schemeClr val="phClr">
+              <a:shade val="95000"/>
+              <a:satMod val="105000"/>
+            </a:schemeClr>
+          </a:solidFill>
+          <a:prstDash val="solid"/>
+        </a:ln>
+        <a:ln w="25400" cap="flat" cmpd="sng" algn="ctr">
+          <a:solidFill>
+            <a:schemeClr val="phClr"/>
+          </a:solidFill>
+          <a:prstDash val="solid"/>
+        </a:ln>
+        <a:ln w="38100" cap="flat" cmpd="sng" algn="ctr">
+          <a:solidFill>
+            <a:schemeClr val="phClr"/>
+          </a:solidFill>
+          <a:prstDash val="solid"/>
+        </a:ln>
+      </a:lnStyleLst>
+      <a:effectStyleLst>
+        <a:effectStyle>
+          <a:effectLst>
+            <a:outerShdw blurRad="40000" dist="20000" dir="5400000" rotWithShape="0">
+              <a:srgbClr val="000000">
+                <a:alpha val="38000"/>
+              </a:srgbClr>
+            </a:outerShdw>
+          </a:effectLst>
+        </a:effectStyle>
+        <a:effectStyle>
+          <a:effectLst>
+            <a:outerShdw blurRad="40000" dist="23000" dir="5400000" rotWithShape="0">
+              <a:srgbClr val="000000">
+                <a:alpha val="35000"/>
+              </a:srgbClr>
+            </a:outerShdw>
+          </a:effectLst>
+        </a:effectStyle>
+        <a:effectStyle>
+          <a:effectLst>
+            <a:outerShdw blurRad="40000" dist="23000" dir="5400000" rotWithShape="0">
+              <a:srgbClr val="000000">
+                <a:alpha val="35000"/>
+              </a:srgbClr>
+            </a:outerShdw>
+          </a:effectLst>
+          <a:scene3d>
+            <a:camera prst="orthographicFront">
+              <a:rot lat="0" lon="0" rev="0"/>
+            </a:camera>
+            <a:lightRig rig="threePt" dir="t">
+              <a:rot lat="0" lon="0" rev="1200000"/>
+            </a:lightRig>
+          </a:scene3d>
+          <a:sp3d>
+            <a:bevelT w="63500" h="25400"/>
+          </a:sp3d>
+        </a:effectStyle>
+      </a:effectStyleLst>
+      <a:bgFillStyleLst>
+        <a:solidFill>
+          <a:schemeClr val="phClr"/>
+        </a:solidFill>
+        <a:gradFill rotWithShape="1">
+          <a:gsLst>
+            <a:gs pos="0">
+              <a:schemeClr val="phClr">
+                <a:tint val="40000"/>
+                <a:satMod val="350000"/>
+              </a:schemeClr>
+            </a:gs>
+            <a:gs pos="40000">
+              <a:schemeClr val="phClr">
+                <a:tint val="45000"/>
+                <a:shade val="99000"/>
+                <a:satMod val="350000"/>
+              </a:schemeClr>
+            </a:gs>
+            <a:gs pos="100000">
+              <a:schemeClr val="phClr">
+                <a:shade val="20000"/>
+                <a:satMod val="255000"/>
+              </a:schemeClr>
+            </a:gs>
+          </a:gsLst>
+          <a:path path="circle">
+            <a:fillToRect l="50000" t="-80000" r="50000" b="180000"/>
+          </a:path>
+        </a:gradFill>
+        <a:gradFill rotWithShape="1">
+          <a:gsLst>
+            <a:gs pos="0">
+              <a:schemeClr val="phClr">
+                <a:tint val="80000"/>
+                <a:satMod val="300000"/>
+              </a:schemeClr>
+            </a:gs>
+            <a:gs pos="100000">
+              <a:schemeClr val="phClr">
+                <a:shade val="30000"/>
+                <a:satMod val="200000"/>
+              </a:schemeClr>
+            </a:gs>
+          </a:gsLst>
+          <a:path path="circle">
+            <a:fillToRect l="50000" t="50000" r="50000" b="50000"/>
+          </a:path>
+        </a:gradFill>
+      </a:bgFillStyleLst>
+    </a:fmtScheme>
+  </a:themeElements>
+</a:theme>
+</file>
+
+<file path=ppt/theme/theme2.xml><?xml version="1.0" encoding="utf-8"?>
 <a:theme xmlns:a="http://schemas.openxmlformats.org/drawingml/2006/main" xmlns:r="http://schemas.openxmlformats.org/officeDocument/2006/relationships" name="Office Theme">
   <a:themeElements>
     <a:clrScheme name="Office">
@@ -12707,283 +13590,4 @@
     </a:fmtScheme>
   </a:themeElements>
 </a:theme>
-</file>
-
-<file path=ppt/theme/theme2.xml><?xml version="1.0" encoding="utf-8"?>
-<a:theme xmlns:a="http://schemas.openxmlformats.org/drawingml/2006/main" xmlns:r="http://schemas.openxmlformats.org/officeDocument/2006/relationships" name="1_Custom Design">
-  <a:themeElements>
-    <a:clrScheme name="Custom 2">
-      <a:dk1>
-        <a:srgbClr val="4B2E83"/>
-      </a:dk1>
-      <a:lt1>
-        <a:srgbClr val="E8D3A2"/>
-      </a:lt1>
-      <a:dk2>
-        <a:srgbClr val="4B2E83"/>
-      </a:dk2>
-      <a:lt2>
-        <a:srgbClr val="FFFFFF"/>
-      </a:lt2>
-      <a:accent1>
-        <a:srgbClr val="4B2E83"/>
-      </a:accent1>
-      <a:accent2>
-        <a:srgbClr val="E8D3A2"/>
-      </a:accent2>
-      <a:accent3>
-        <a:srgbClr val="FFFFFF"/>
-      </a:accent3>
-      <a:accent4>
-        <a:srgbClr val="D8D9DA"/>
-      </a:accent4>
-      <a:accent5>
-        <a:srgbClr val="999999"/>
-      </a:accent5>
-      <a:accent6>
-        <a:srgbClr val="917B4C"/>
-      </a:accent6>
-      <a:hlink>
-        <a:srgbClr val="D8D9DA"/>
-      </a:hlink>
-      <a:folHlink>
-        <a:srgbClr val="999999"/>
-      </a:folHlink>
-    </a:clrScheme>
-    <a:fontScheme name="Office">
-      <a:majorFont>
-        <a:latin typeface="Arial"/>
-        <a:ea typeface=""/>
-        <a:cs typeface=""/>
-        <a:font script="Jpan" typeface="ＭＳ Ｐゴシック"/>
-        <a:font script="Hang" typeface="맑은 고딕"/>
-        <a:font script="Hans" typeface="宋体"/>
-        <a:font script="Hant" typeface="新細明體"/>
-        <a:font script="Arab" typeface="Times New Roman"/>
-        <a:font script="Hebr" typeface="Times New Roman"/>
-        <a:font script="Thai" typeface="Angsana New"/>
-        <a:font script="Ethi" typeface="Nyala"/>
-        <a:font script="Beng" typeface="Vrinda"/>
-        <a:font script="Gujr" typeface="Shruti"/>
-        <a:font script="Khmr" typeface="MoolBoran"/>
-        <a:font script="Knda" typeface="Tunga"/>
-        <a:font script="Guru" typeface="Raavi"/>
-        <a:font script="Cans" typeface="Euphemia"/>
-        <a:font script="Cher" typeface="Plantagenet Cherokee"/>
-        <a:font script="Yiii" typeface="Microsoft Yi Baiti"/>
-        <a:font script="Tibt" typeface="Microsoft Himalaya"/>
-        <a:font script="Thaa" typeface="MV Boli"/>
-        <a:font script="Deva" typeface="Mangal"/>
-        <a:font script="Telu" typeface="Gautami"/>
-        <a:font script="Taml" typeface="Latha"/>
-        <a:font script="Syrc" typeface="Estrangelo Edessa"/>
-        <a:font script="Orya" typeface="Kalinga"/>
-        <a:font script="Mlym" typeface="Kartika"/>
-        <a:font script="Laoo" typeface="DokChampa"/>
-        <a:font script="Sinh" typeface="Iskoola Pota"/>
-        <a:font script="Mong" typeface="Mongolian Baiti"/>
-        <a:font script="Viet" typeface="Times New Roman"/>
-        <a:font script="Uigh" typeface="Microsoft Uighur"/>
-        <a:font script="Geor" typeface="Sylfaen"/>
-      </a:majorFont>
-      <a:minorFont>
-        <a:latin typeface="Arial"/>
-        <a:ea typeface=""/>
-        <a:cs typeface=""/>
-        <a:font script="Jpan" typeface="ＭＳ Ｐゴシック"/>
-        <a:font script="Hang" typeface="맑은 고딕"/>
-        <a:font script="Hans" typeface="宋体"/>
-        <a:font script="Hant" typeface="新細明體"/>
-        <a:font script="Arab" typeface="Arial"/>
-        <a:font script="Hebr" typeface="Arial"/>
-        <a:font script="Thai" typeface="Cordia New"/>
-        <a:font script="Ethi" typeface="Nyala"/>
-        <a:font script="Beng" typeface="Vrinda"/>
-        <a:font script="Gujr" typeface="Shruti"/>
-        <a:font script="Khmr" typeface="DaunPenh"/>
-        <a:font script="Knda" typeface="Tunga"/>
-        <a:font script="Guru" typeface="Raavi"/>
-        <a:font script="Cans" typeface="Euphemia"/>
-        <a:font script="Cher" typeface="Plantagenet Cherokee"/>
-        <a:font script="Yiii" typeface="Microsoft Yi Baiti"/>
-        <a:font script="Tibt" typeface="Microsoft Himalaya"/>
-        <a:font script="Thaa" typeface="MV Boli"/>
-        <a:font script="Deva" typeface="Mangal"/>
-        <a:font script="Telu" typeface="Gautami"/>
-        <a:font script="Taml" typeface="Latha"/>
-        <a:font script="Syrc" typeface="Estrangelo Edessa"/>
-        <a:font script="Orya" typeface="Kalinga"/>
-        <a:font script="Mlym" typeface="Kartika"/>
-        <a:font script="Laoo" typeface="DokChampa"/>
-        <a:font script="Sinh" typeface="Iskoola Pota"/>
-        <a:font script="Mong" typeface="Mongolian Baiti"/>
-        <a:font script="Viet" typeface="Arial"/>
-        <a:font script="Uigh" typeface="Microsoft Uighur"/>
-        <a:font script="Geor" typeface="Sylfaen"/>
-      </a:minorFont>
-    </a:fontScheme>
-    <a:fmtScheme name="Office">
-      <a:fillStyleLst>
-        <a:solidFill>
-          <a:schemeClr val="phClr"/>
-        </a:solidFill>
-        <a:gradFill rotWithShape="1">
-          <a:gsLst>
-            <a:gs pos="0">
-              <a:schemeClr val="phClr">
-                <a:tint val="50000"/>
-                <a:satMod val="300000"/>
-              </a:schemeClr>
-            </a:gs>
-            <a:gs pos="35000">
-              <a:schemeClr val="phClr">
-                <a:tint val="37000"/>
-                <a:satMod val="300000"/>
-              </a:schemeClr>
-            </a:gs>
-            <a:gs pos="100000">
-              <a:schemeClr val="phClr">
-                <a:tint val="15000"/>
-                <a:satMod val="350000"/>
-              </a:schemeClr>
-            </a:gs>
-          </a:gsLst>
-          <a:lin ang="16200000" scaled="1"/>
-        </a:gradFill>
-        <a:gradFill rotWithShape="1">
-          <a:gsLst>
-            <a:gs pos="0">
-              <a:schemeClr val="phClr">
-                <a:tint val="100000"/>
-                <a:shade val="100000"/>
-                <a:satMod val="130000"/>
-              </a:schemeClr>
-            </a:gs>
-            <a:gs pos="100000">
-              <a:schemeClr val="phClr">
-                <a:tint val="50000"/>
-                <a:shade val="100000"/>
-                <a:satMod val="350000"/>
-              </a:schemeClr>
-            </a:gs>
-          </a:gsLst>
-          <a:lin ang="16200000" scaled="0"/>
-        </a:gradFill>
-      </a:fillStyleLst>
-      <a:lnStyleLst>
-        <a:ln w="9525" cap="flat" cmpd="sng" algn="ctr">
-          <a:solidFill>
-            <a:schemeClr val="phClr">
-              <a:shade val="95000"/>
-              <a:satMod val="105000"/>
-            </a:schemeClr>
-          </a:solidFill>
-          <a:prstDash val="solid"/>
-        </a:ln>
-        <a:ln w="25400" cap="flat" cmpd="sng" algn="ctr">
-          <a:solidFill>
-            <a:schemeClr val="phClr"/>
-          </a:solidFill>
-          <a:prstDash val="solid"/>
-        </a:ln>
-        <a:ln w="38100" cap="flat" cmpd="sng" algn="ctr">
-          <a:solidFill>
-            <a:schemeClr val="phClr"/>
-          </a:solidFill>
-          <a:prstDash val="solid"/>
-        </a:ln>
-      </a:lnStyleLst>
-      <a:effectStyleLst>
-        <a:effectStyle>
-          <a:effectLst>
-            <a:outerShdw blurRad="40000" dist="20000" dir="5400000" rotWithShape="0">
-              <a:srgbClr val="000000">
-                <a:alpha val="38000"/>
-              </a:srgbClr>
-            </a:outerShdw>
-          </a:effectLst>
-        </a:effectStyle>
-        <a:effectStyle>
-          <a:effectLst>
-            <a:outerShdw blurRad="40000" dist="23000" dir="5400000" rotWithShape="0">
-              <a:srgbClr val="000000">
-                <a:alpha val="35000"/>
-              </a:srgbClr>
-            </a:outerShdw>
-          </a:effectLst>
-        </a:effectStyle>
-        <a:effectStyle>
-          <a:effectLst>
-            <a:outerShdw blurRad="40000" dist="23000" dir="5400000" rotWithShape="0">
-              <a:srgbClr val="000000">
-                <a:alpha val="35000"/>
-              </a:srgbClr>
-            </a:outerShdw>
-          </a:effectLst>
-          <a:scene3d>
-            <a:camera prst="orthographicFront">
-              <a:rot lat="0" lon="0" rev="0"/>
-            </a:camera>
-            <a:lightRig rig="threePt" dir="t">
-              <a:rot lat="0" lon="0" rev="1200000"/>
-            </a:lightRig>
-          </a:scene3d>
-          <a:sp3d>
-            <a:bevelT w="63500" h="25400"/>
-          </a:sp3d>
-        </a:effectStyle>
-      </a:effectStyleLst>
-      <a:bgFillStyleLst>
-        <a:solidFill>
-          <a:schemeClr val="phClr"/>
-        </a:solidFill>
-        <a:gradFill rotWithShape="1">
-          <a:gsLst>
-            <a:gs pos="0">
-              <a:schemeClr val="phClr">
-                <a:tint val="40000"/>
-                <a:satMod val="350000"/>
-              </a:schemeClr>
-            </a:gs>
-            <a:gs pos="40000">
-              <a:schemeClr val="phClr">
-                <a:tint val="45000"/>
-                <a:shade val="99000"/>
-                <a:satMod val="350000"/>
-              </a:schemeClr>
-            </a:gs>
-            <a:gs pos="100000">
-              <a:schemeClr val="phClr">
-                <a:shade val="20000"/>
-                <a:satMod val="255000"/>
-              </a:schemeClr>
-            </a:gs>
-          </a:gsLst>
-          <a:path path="circle">
-            <a:fillToRect l="50000" t="-80000" r="50000" b="180000"/>
-          </a:path>
-        </a:gradFill>
-        <a:gradFill rotWithShape="1">
-          <a:gsLst>
-            <a:gs pos="0">
-              <a:schemeClr val="phClr">
-                <a:tint val="80000"/>
-                <a:satMod val="300000"/>
-              </a:schemeClr>
-            </a:gs>
-            <a:gs pos="100000">
-              <a:schemeClr val="phClr">
-                <a:shade val="30000"/>
-                <a:satMod val="200000"/>
-              </a:schemeClr>
-            </a:gs>
-          </a:gsLst>
-          <a:path path="circle">
-            <a:fillToRect l="50000" t="50000" r="50000" b="50000"/>
-          </a:path>
-        </a:gradFill>
-      </a:bgFillStyleLst>
-    </a:fmtScheme>
-  </a:themeElements>
-</a:theme>
 </file>
</xml_diff>

<commit_message>
tech reveiw MLM update
</commit_message>
<xml_diff>
--- a/doc/Technology Review Machine Learning.pptx
+++ b/doc/Technology Review Machine Learning.pptx
@@ -9673,7 +9673,7 @@
             <a:tbl>
               <a:tblPr>
                 <a:noFill/>
-                <a:tableStyleId>{25326031-EB42-494C-8DCF-CAA8A3973919}</a:tableStyleId>
+                <a:tableStyleId>{6F570941-744B-4CD6-B8BE-3CB4B24EEBF7}</a:tableStyleId>
               </a:tblPr>
               <a:tblGrid>
                 <a:gridCol w="1012650"/>
@@ -12362,7 +12362,7 @@
             <a:tbl>
               <a:tblPr>
                 <a:noFill/>
-                <a:tableStyleId>{25326031-EB42-494C-8DCF-CAA8A3973919}</a:tableStyleId>
+                <a:tableStyleId>{6F570941-744B-4CD6-B8BE-3CB4B24EEBF7}</a:tableStyleId>
               </a:tblPr>
               <a:tblGrid>
                 <a:gridCol w="1076625"/>
@@ -12429,7 +12429,7 @@
                       </a:pPr>
                       <a:r>
                         <a:rPr lang="en-US"/>
-                        <a:t>Charge Capacity (ah)</a:t>
+                        <a:t>Charge Capacity (Ah)</a:t>
                       </a:r>
                       <a:endParaRPr/>
                     </a:p>
@@ -12452,7 +12452,7 @@
                       </a:pPr>
                       <a:r>
                         <a:rPr lang="en-US"/>
-                        <a:t>Discharge Capacity (ah)</a:t>
+                        <a:t>Discharge Capacity (Ah)</a:t>
                       </a:r>
                       <a:endParaRPr/>
                     </a:p>
@@ -12923,8 +12923,8 @@
         </p:nvSpPr>
         <p:spPr>
           <a:xfrm>
-            <a:off x="651275" y="1687375"/>
-            <a:ext cx="5062200" cy="2539800"/>
+            <a:off x="651275" y="1458775"/>
+            <a:ext cx="5062200" cy="3063000"/>
           </a:xfrm>
           <a:prstGeom prst="rect">
             <a:avLst/>
@@ -12986,7 +12986,7 @@
             </a:pPr>
             <a:r>
               <a:rPr lang="en-US" sz="1700"/>
-              <a:t>Result for coulombic efficiency </a:t>
+              <a:t>Result for coulombic efficiency have a higher error for test perhaps due to high variance </a:t>
             </a:r>
             <a:endParaRPr sz="1700"/>
           </a:p>
@@ -13035,6 +13035,285 @@
 </file>
 
 <file path=ppt/theme/theme1.xml><?xml version="1.0" encoding="utf-8"?>
+<a:theme xmlns:a="http://schemas.openxmlformats.org/drawingml/2006/main" xmlns:r="http://schemas.openxmlformats.org/officeDocument/2006/relationships" name="Office Theme">
+  <a:themeElements>
+    <a:clrScheme name="Office">
+      <a:dk1>
+        <a:srgbClr val="000000"/>
+      </a:dk1>
+      <a:lt1>
+        <a:srgbClr val="FFFFFF"/>
+      </a:lt1>
+      <a:dk2>
+        <a:srgbClr val="44546A"/>
+      </a:dk2>
+      <a:lt2>
+        <a:srgbClr val="E7E6E6"/>
+      </a:lt2>
+      <a:accent1>
+        <a:srgbClr val="4472C4"/>
+      </a:accent1>
+      <a:accent2>
+        <a:srgbClr val="ED7D31"/>
+      </a:accent2>
+      <a:accent3>
+        <a:srgbClr val="A5A5A5"/>
+      </a:accent3>
+      <a:accent4>
+        <a:srgbClr val="FFC000"/>
+      </a:accent4>
+      <a:accent5>
+        <a:srgbClr val="5B9BD5"/>
+      </a:accent5>
+      <a:accent6>
+        <a:srgbClr val="70AD47"/>
+      </a:accent6>
+      <a:hlink>
+        <a:srgbClr val="0563C1"/>
+      </a:hlink>
+      <a:folHlink>
+        <a:srgbClr val="954F72"/>
+      </a:folHlink>
+    </a:clrScheme>
+    <a:fontScheme name="Office">
+      <a:majorFont>
+        <a:latin typeface="Arial"/>
+        <a:ea typeface=""/>
+        <a:cs typeface=""/>
+        <a:font script="Jpan" typeface="ＭＳ Ｐゴシック"/>
+        <a:font script="Hang" typeface="맑은 고딕"/>
+        <a:font script="Hans" typeface="宋体"/>
+        <a:font script="Hant" typeface="新細明體"/>
+        <a:font script="Arab" typeface="Times New Roman"/>
+        <a:font script="Hebr" typeface="Times New Roman"/>
+        <a:font script="Thai" typeface="Angsana New"/>
+        <a:font script="Ethi" typeface="Nyala"/>
+        <a:font script="Beng" typeface="Vrinda"/>
+        <a:font script="Gujr" typeface="Shruti"/>
+        <a:font script="Khmr" typeface="MoolBoran"/>
+        <a:font script="Knda" typeface="Tunga"/>
+        <a:font script="Guru" typeface="Raavi"/>
+        <a:font script="Cans" typeface="Euphemia"/>
+        <a:font script="Cher" typeface="Plantagenet Cherokee"/>
+        <a:font script="Yiii" typeface="Microsoft Yi Baiti"/>
+        <a:font script="Tibt" typeface="Microsoft Himalaya"/>
+        <a:font script="Thaa" typeface="MV Boli"/>
+        <a:font script="Deva" typeface="Mangal"/>
+        <a:font script="Telu" typeface="Gautami"/>
+        <a:font script="Taml" typeface="Latha"/>
+        <a:font script="Syrc" typeface="Estrangelo Edessa"/>
+        <a:font script="Orya" typeface="Kalinga"/>
+        <a:font script="Mlym" typeface="Kartika"/>
+        <a:font script="Laoo" typeface="DokChampa"/>
+        <a:font script="Sinh" typeface="Iskoola Pota"/>
+        <a:font script="Mong" typeface="Mongolian Baiti"/>
+        <a:font script="Viet" typeface="Times New Roman"/>
+        <a:font script="Uigh" typeface="Microsoft Uighur"/>
+        <a:font script="Geor" typeface="Sylfaen"/>
+      </a:majorFont>
+      <a:minorFont>
+        <a:latin typeface="Arial"/>
+        <a:ea typeface=""/>
+        <a:cs typeface=""/>
+        <a:font script="Jpan" typeface="ＭＳ Ｐゴシック"/>
+        <a:font script="Hang" typeface="맑은 고딕"/>
+        <a:font script="Hans" typeface="宋体"/>
+        <a:font script="Hant" typeface="新細明體"/>
+        <a:font script="Arab" typeface="Arial"/>
+        <a:font script="Hebr" typeface="Arial"/>
+        <a:font script="Thai" typeface="Cordia New"/>
+        <a:font script="Ethi" typeface="Nyala"/>
+        <a:font script="Beng" typeface="Vrinda"/>
+        <a:font script="Gujr" typeface="Shruti"/>
+        <a:font script="Khmr" typeface="DaunPenh"/>
+        <a:font script="Knda" typeface="Tunga"/>
+        <a:font script="Guru" typeface="Raavi"/>
+        <a:font script="Cans" typeface="Euphemia"/>
+        <a:font script="Cher" typeface="Plantagenet Cherokee"/>
+        <a:font script="Yiii" typeface="Microsoft Yi Baiti"/>
+        <a:font script="Tibt" typeface="Microsoft Himalaya"/>
+        <a:font script="Thaa" typeface="MV Boli"/>
+        <a:font script="Deva" typeface="Mangal"/>
+        <a:font script="Telu" typeface="Gautami"/>
+        <a:font script="Taml" typeface="Latha"/>
+        <a:font script="Syrc" typeface="Estrangelo Edessa"/>
+        <a:font script="Orya" typeface="Kalinga"/>
+        <a:font script="Mlym" typeface="Kartika"/>
+        <a:font script="Laoo" typeface="DokChampa"/>
+        <a:font script="Sinh" typeface="Iskoola Pota"/>
+        <a:font script="Mong" typeface="Mongolian Baiti"/>
+        <a:font script="Viet" typeface="Arial"/>
+        <a:font script="Uigh" typeface="Microsoft Uighur"/>
+        <a:font script="Geor" typeface="Sylfaen"/>
+      </a:minorFont>
+    </a:fontScheme>
+    <a:fmtScheme name="Office">
+      <a:fillStyleLst>
+        <a:solidFill>
+          <a:schemeClr val="phClr"/>
+        </a:solidFill>
+        <a:gradFill rotWithShape="1">
+          <a:gsLst>
+            <a:gs pos="0">
+              <a:schemeClr val="phClr">
+                <a:tint val="50000"/>
+                <a:satMod val="300000"/>
+              </a:schemeClr>
+            </a:gs>
+            <a:gs pos="35000">
+              <a:schemeClr val="phClr">
+                <a:tint val="37000"/>
+                <a:satMod val="300000"/>
+              </a:schemeClr>
+            </a:gs>
+            <a:gs pos="100000">
+              <a:schemeClr val="phClr">
+                <a:tint val="15000"/>
+                <a:satMod val="350000"/>
+              </a:schemeClr>
+            </a:gs>
+          </a:gsLst>
+          <a:lin ang="16200000" scaled="1"/>
+        </a:gradFill>
+        <a:gradFill rotWithShape="1">
+          <a:gsLst>
+            <a:gs pos="0">
+              <a:schemeClr val="phClr">
+                <a:tint val="100000"/>
+                <a:shade val="100000"/>
+                <a:satMod val="130000"/>
+              </a:schemeClr>
+            </a:gs>
+            <a:gs pos="100000">
+              <a:schemeClr val="phClr">
+                <a:tint val="50000"/>
+                <a:shade val="100000"/>
+                <a:satMod val="350000"/>
+              </a:schemeClr>
+            </a:gs>
+          </a:gsLst>
+          <a:lin ang="16200000" scaled="0"/>
+        </a:gradFill>
+      </a:fillStyleLst>
+      <a:lnStyleLst>
+        <a:ln w="9525" cap="flat" cmpd="sng" algn="ctr">
+          <a:solidFill>
+            <a:schemeClr val="phClr">
+              <a:shade val="95000"/>
+              <a:satMod val="105000"/>
+            </a:schemeClr>
+          </a:solidFill>
+          <a:prstDash val="solid"/>
+        </a:ln>
+        <a:ln w="25400" cap="flat" cmpd="sng" algn="ctr">
+          <a:solidFill>
+            <a:schemeClr val="phClr"/>
+          </a:solidFill>
+          <a:prstDash val="solid"/>
+        </a:ln>
+        <a:ln w="38100" cap="flat" cmpd="sng" algn="ctr">
+          <a:solidFill>
+            <a:schemeClr val="phClr"/>
+          </a:solidFill>
+          <a:prstDash val="solid"/>
+        </a:ln>
+      </a:lnStyleLst>
+      <a:effectStyleLst>
+        <a:effectStyle>
+          <a:effectLst>
+            <a:outerShdw blurRad="40000" dist="20000" dir="5400000" rotWithShape="0">
+              <a:srgbClr val="000000">
+                <a:alpha val="38000"/>
+              </a:srgbClr>
+            </a:outerShdw>
+          </a:effectLst>
+        </a:effectStyle>
+        <a:effectStyle>
+          <a:effectLst>
+            <a:outerShdw blurRad="40000" dist="23000" dir="5400000" rotWithShape="0">
+              <a:srgbClr val="000000">
+                <a:alpha val="35000"/>
+              </a:srgbClr>
+            </a:outerShdw>
+          </a:effectLst>
+        </a:effectStyle>
+        <a:effectStyle>
+          <a:effectLst>
+            <a:outerShdw blurRad="40000" dist="23000" dir="5400000" rotWithShape="0">
+              <a:srgbClr val="000000">
+                <a:alpha val="35000"/>
+              </a:srgbClr>
+            </a:outerShdw>
+          </a:effectLst>
+          <a:scene3d>
+            <a:camera prst="orthographicFront">
+              <a:rot lat="0" lon="0" rev="0"/>
+            </a:camera>
+            <a:lightRig rig="threePt" dir="t">
+              <a:rot lat="0" lon="0" rev="1200000"/>
+            </a:lightRig>
+          </a:scene3d>
+          <a:sp3d>
+            <a:bevelT w="63500" h="25400"/>
+          </a:sp3d>
+        </a:effectStyle>
+      </a:effectStyleLst>
+      <a:bgFillStyleLst>
+        <a:solidFill>
+          <a:schemeClr val="phClr"/>
+        </a:solidFill>
+        <a:gradFill rotWithShape="1">
+          <a:gsLst>
+            <a:gs pos="0">
+              <a:schemeClr val="phClr">
+                <a:tint val="40000"/>
+                <a:satMod val="350000"/>
+              </a:schemeClr>
+            </a:gs>
+            <a:gs pos="40000">
+              <a:schemeClr val="phClr">
+                <a:tint val="45000"/>
+                <a:shade val="99000"/>
+                <a:satMod val="350000"/>
+              </a:schemeClr>
+            </a:gs>
+            <a:gs pos="100000">
+              <a:schemeClr val="phClr">
+                <a:shade val="20000"/>
+                <a:satMod val="255000"/>
+              </a:schemeClr>
+            </a:gs>
+          </a:gsLst>
+          <a:path path="circle">
+            <a:fillToRect l="50000" t="-80000" r="50000" b="180000"/>
+          </a:path>
+        </a:gradFill>
+        <a:gradFill rotWithShape="1">
+          <a:gsLst>
+            <a:gs pos="0">
+              <a:schemeClr val="phClr">
+                <a:tint val="80000"/>
+                <a:satMod val="300000"/>
+              </a:schemeClr>
+            </a:gs>
+            <a:gs pos="100000">
+              <a:schemeClr val="phClr">
+                <a:shade val="30000"/>
+                <a:satMod val="200000"/>
+              </a:schemeClr>
+            </a:gs>
+          </a:gsLst>
+          <a:path path="circle">
+            <a:fillToRect l="50000" t="50000" r="50000" b="50000"/>
+          </a:path>
+        </a:gradFill>
+      </a:bgFillStyleLst>
+    </a:fmtScheme>
+  </a:themeElements>
+</a:theme>
+</file>
+
+<file path=ppt/theme/theme2.xml><?xml version="1.0" encoding="utf-8"?>
 <a:theme xmlns:a="http://schemas.openxmlformats.org/drawingml/2006/main" xmlns:r="http://schemas.openxmlformats.org/officeDocument/2006/relationships" name="1_Custom Design">
   <a:themeElements>
     <a:clrScheme name="Custom 2">
@@ -13311,283 +13590,4 @@
     </a:fmtScheme>
   </a:themeElements>
 </a:theme>
-</file>
-
-<file path=ppt/theme/theme2.xml><?xml version="1.0" encoding="utf-8"?>
-<a:theme xmlns:a="http://schemas.openxmlformats.org/drawingml/2006/main" xmlns:r="http://schemas.openxmlformats.org/officeDocument/2006/relationships" name="Office Theme">
-  <a:themeElements>
-    <a:clrScheme name="Office">
-      <a:dk1>
-        <a:srgbClr val="000000"/>
-      </a:dk1>
-      <a:lt1>
-        <a:srgbClr val="FFFFFF"/>
-      </a:lt1>
-      <a:dk2>
-        <a:srgbClr val="44546A"/>
-      </a:dk2>
-      <a:lt2>
-        <a:srgbClr val="E7E6E6"/>
-      </a:lt2>
-      <a:accent1>
-        <a:srgbClr val="4472C4"/>
-      </a:accent1>
-      <a:accent2>
-        <a:srgbClr val="ED7D31"/>
-      </a:accent2>
-      <a:accent3>
-        <a:srgbClr val="A5A5A5"/>
-      </a:accent3>
-      <a:accent4>
-        <a:srgbClr val="FFC000"/>
-      </a:accent4>
-      <a:accent5>
-        <a:srgbClr val="5B9BD5"/>
-      </a:accent5>
-      <a:accent6>
-        <a:srgbClr val="70AD47"/>
-      </a:accent6>
-      <a:hlink>
-        <a:srgbClr val="0563C1"/>
-      </a:hlink>
-      <a:folHlink>
-        <a:srgbClr val="954F72"/>
-      </a:folHlink>
-    </a:clrScheme>
-    <a:fontScheme name="Office">
-      <a:majorFont>
-        <a:latin typeface="Arial"/>
-        <a:ea typeface=""/>
-        <a:cs typeface=""/>
-        <a:font script="Jpan" typeface="ＭＳ Ｐゴシック"/>
-        <a:font script="Hang" typeface="맑은 고딕"/>
-        <a:font script="Hans" typeface="宋体"/>
-        <a:font script="Hant" typeface="新細明體"/>
-        <a:font script="Arab" typeface="Times New Roman"/>
-        <a:font script="Hebr" typeface="Times New Roman"/>
-        <a:font script="Thai" typeface="Angsana New"/>
-        <a:font script="Ethi" typeface="Nyala"/>
-        <a:font script="Beng" typeface="Vrinda"/>
-        <a:font script="Gujr" typeface="Shruti"/>
-        <a:font script="Khmr" typeface="MoolBoran"/>
-        <a:font script="Knda" typeface="Tunga"/>
-        <a:font script="Guru" typeface="Raavi"/>
-        <a:font script="Cans" typeface="Euphemia"/>
-        <a:font script="Cher" typeface="Plantagenet Cherokee"/>
-        <a:font script="Yiii" typeface="Microsoft Yi Baiti"/>
-        <a:font script="Tibt" typeface="Microsoft Himalaya"/>
-        <a:font script="Thaa" typeface="MV Boli"/>
-        <a:font script="Deva" typeface="Mangal"/>
-        <a:font script="Telu" typeface="Gautami"/>
-        <a:font script="Taml" typeface="Latha"/>
-        <a:font script="Syrc" typeface="Estrangelo Edessa"/>
-        <a:font script="Orya" typeface="Kalinga"/>
-        <a:font script="Mlym" typeface="Kartika"/>
-        <a:font script="Laoo" typeface="DokChampa"/>
-        <a:font script="Sinh" typeface="Iskoola Pota"/>
-        <a:font script="Mong" typeface="Mongolian Baiti"/>
-        <a:font script="Viet" typeface="Times New Roman"/>
-        <a:font script="Uigh" typeface="Microsoft Uighur"/>
-        <a:font script="Geor" typeface="Sylfaen"/>
-      </a:majorFont>
-      <a:minorFont>
-        <a:latin typeface="Arial"/>
-        <a:ea typeface=""/>
-        <a:cs typeface=""/>
-        <a:font script="Jpan" typeface="ＭＳ Ｐゴシック"/>
-        <a:font script="Hang" typeface="맑은 고딕"/>
-        <a:font script="Hans" typeface="宋体"/>
-        <a:font script="Hant" typeface="新細明體"/>
-        <a:font script="Arab" typeface="Arial"/>
-        <a:font script="Hebr" typeface="Arial"/>
-        <a:font script="Thai" typeface="Cordia New"/>
-        <a:font script="Ethi" typeface="Nyala"/>
-        <a:font script="Beng" typeface="Vrinda"/>
-        <a:font script="Gujr" typeface="Shruti"/>
-        <a:font script="Khmr" typeface="DaunPenh"/>
-        <a:font script="Knda" typeface="Tunga"/>
-        <a:font script="Guru" typeface="Raavi"/>
-        <a:font script="Cans" typeface="Euphemia"/>
-        <a:font script="Cher" typeface="Plantagenet Cherokee"/>
-        <a:font script="Yiii" typeface="Microsoft Yi Baiti"/>
-        <a:font script="Tibt" typeface="Microsoft Himalaya"/>
-        <a:font script="Thaa" typeface="MV Boli"/>
-        <a:font script="Deva" typeface="Mangal"/>
-        <a:font script="Telu" typeface="Gautami"/>
-        <a:font script="Taml" typeface="Latha"/>
-        <a:font script="Syrc" typeface="Estrangelo Edessa"/>
-        <a:font script="Orya" typeface="Kalinga"/>
-        <a:font script="Mlym" typeface="Kartika"/>
-        <a:font script="Laoo" typeface="DokChampa"/>
-        <a:font script="Sinh" typeface="Iskoola Pota"/>
-        <a:font script="Mong" typeface="Mongolian Baiti"/>
-        <a:font script="Viet" typeface="Arial"/>
-        <a:font script="Uigh" typeface="Microsoft Uighur"/>
-        <a:font script="Geor" typeface="Sylfaen"/>
-      </a:minorFont>
-    </a:fontScheme>
-    <a:fmtScheme name="Office">
-      <a:fillStyleLst>
-        <a:solidFill>
-          <a:schemeClr val="phClr"/>
-        </a:solidFill>
-        <a:gradFill rotWithShape="1">
-          <a:gsLst>
-            <a:gs pos="0">
-              <a:schemeClr val="phClr">
-                <a:tint val="50000"/>
-                <a:satMod val="300000"/>
-              </a:schemeClr>
-            </a:gs>
-            <a:gs pos="35000">
-              <a:schemeClr val="phClr">
-                <a:tint val="37000"/>
-                <a:satMod val="300000"/>
-              </a:schemeClr>
-            </a:gs>
-            <a:gs pos="100000">
-              <a:schemeClr val="phClr">
-                <a:tint val="15000"/>
-                <a:satMod val="350000"/>
-              </a:schemeClr>
-            </a:gs>
-          </a:gsLst>
-          <a:lin ang="16200000" scaled="1"/>
-        </a:gradFill>
-        <a:gradFill rotWithShape="1">
-          <a:gsLst>
-            <a:gs pos="0">
-              <a:schemeClr val="phClr">
-                <a:tint val="100000"/>
-                <a:shade val="100000"/>
-                <a:satMod val="130000"/>
-              </a:schemeClr>
-            </a:gs>
-            <a:gs pos="100000">
-              <a:schemeClr val="phClr">
-                <a:tint val="50000"/>
-                <a:shade val="100000"/>
-                <a:satMod val="350000"/>
-              </a:schemeClr>
-            </a:gs>
-          </a:gsLst>
-          <a:lin ang="16200000" scaled="0"/>
-        </a:gradFill>
-      </a:fillStyleLst>
-      <a:lnStyleLst>
-        <a:ln w="9525" cap="flat" cmpd="sng" algn="ctr">
-          <a:solidFill>
-            <a:schemeClr val="phClr">
-              <a:shade val="95000"/>
-              <a:satMod val="105000"/>
-            </a:schemeClr>
-          </a:solidFill>
-          <a:prstDash val="solid"/>
-        </a:ln>
-        <a:ln w="25400" cap="flat" cmpd="sng" algn="ctr">
-          <a:solidFill>
-            <a:schemeClr val="phClr"/>
-          </a:solidFill>
-          <a:prstDash val="solid"/>
-        </a:ln>
-        <a:ln w="38100" cap="flat" cmpd="sng" algn="ctr">
-          <a:solidFill>
-            <a:schemeClr val="phClr"/>
-          </a:solidFill>
-          <a:prstDash val="solid"/>
-        </a:ln>
-      </a:lnStyleLst>
-      <a:effectStyleLst>
-        <a:effectStyle>
-          <a:effectLst>
-            <a:outerShdw blurRad="40000" dist="20000" dir="5400000" rotWithShape="0">
-              <a:srgbClr val="000000">
-                <a:alpha val="38000"/>
-              </a:srgbClr>
-            </a:outerShdw>
-          </a:effectLst>
-        </a:effectStyle>
-        <a:effectStyle>
-          <a:effectLst>
-            <a:outerShdw blurRad="40000" dist="23000" dir="5400000" rotWithShape="0">
-              <a:srgbClr val="000000">
-                <a:alpha val="35000"/>
-              </a:srgbClr>
-            </a:outerShdw>
-          </a:effectLst>
-        </a:effectStyle>
-        <a:effectStyle>
-          <a:effectLst>
-            <a:outerShdw blurRad="40000" dist="23000" dir="5400000" rotWithShape="0">
-              <a:srgbClr val="000000">
-                <a:alpha val="35000"/>
-              </a:srgbClr>
-            </a:outerShdw>
-          </a:effectLst>
-          <a:scene3d>
-            <a:camera prst="orthographicFront">
-              <a:rot lat="0" lon="0" rev="0"/>
-            </a:camera>
-            <a:lightRig rig="threePt" dir="t">
-              <a:rot lat="0" lon="0" rev="1200000"/>
-            </a:lightRig>
-          </a:scene3d>
-          <a:sp3d>
-            <a:bevelT w="63500" h="25400"/>
-          </a:sp3d>
-        </a:effectStyle>
-      </a:effectStyleLst>
-      <a:bgFillStyleLst>
-        <a:solidFill>
-          <a:schemeClr val="phClr"/>
-        </a:solidFill>
-        <a:gradFill rotWithShape="1">
-          <a:gsLst>
-            <a:gs pos="0">
-              <a:schemeClr val="phClr">
-                <a:tint val="40000"/>
-                <a:satMod val="350000"/>
-              </a:schemeClr>
-            </a:gs>
-            <a:gs pos="40000">
-              <a:schemeClr val="phClr">
-                <a:tint val="45000"/>
-                <a:shade val="99000"/>
-                <a:satMod val="350000"/>
-              </a:schemeClr>
-            </a:gs>
-            <a:gs pos="100000">
-              <a:schemeClr val="phClr">
-                <a:shade val="20000"/>
-                <a:satMod val="255000"/>
-              </a:schemeClr>
-            </a:gs>
-          </a:gsLst>
-          <a:path path="circle">
-            <a:fillToRect l="50000" t="-80000" r="50000" b="180000"/>
-          </a:path>
-        </a:gradFill>
-        <a:gradFill rotWithShape="1">
-          <a:gsLst>
-            <a:gs pos="0">
-              <a:schemeClr val="phClr">
-                <a:tint val="80000"/>
-                <a:satMod val="300000"/>
-              </a:schemeClr>
-            </a:gs>
-            <a:gs pos="100000">
-              <a:schemeClr val="phClr">
-                <a:shade val="30000"/>
-                <a:satMod val="200000"/>
-              </a:schemeClr>
-            </a:gs>
-          </a:gsLst>
-          <a:path path="circle">
-            <a:fillToRect l="50000" t="50000" r="50000" b="50000"/>
-          </a:path>
-        </a:gradFill>
-      </a:bgFillStyleLst>
-    </a:fmtScheme>
-  </a:themeElements>
-</a:theme>
 </file>
</xml_diff>